<commit_message>
Update Zero-to-Binder ppt pres
Add code-along slides to pin dependencies, play with notebooks,
share the binder link and launch JupyterLab


Former-commit-id: 739655ebd97465c1a53b08616246ca7a87dfebc4
</commit_message>
<xml_diff>
--- a/workshops/boost-research-reproducibility-binder/workshop-presentations/zero_to_binder.pptx
+++ b/workshops/boost-research-reproducibility-binder/workshop-presentations/zero_to_binder.pptx
@@ -10,6 +10,11 @@
     <p:sldId id="258" r:id="rId4"/>
     <p:sldId id="259" r:id="rId5"/>
     <p:sldId id="260" r:id="rId6"/>
+    <p:sldId id="261" r:id="rId7"/>
+    <p:sldId id="262" r:id="rId8"/>
+    <p:sldId id="263" r:id="rId9"/>
+    <p:sldId id="264" r:id="rId10"/>
+    <p:sldId id="265" r:id="rId11"/>
   </p:sldIdLst>
   <p:sldSz cx="12192000" cy="6858000"/>
   <p:notesSz cx="6858000" cy="9144000"/>
@@ -3570,6 +3575,189 @@
 </p:sld>
 </file>
 
+<file path=ppt/slides/slide10.xml><?xml version="1.0" encoding="utf-8"?>
+<p:sld xmlns:a="http://schemas.openxmlformats.org/drawingml/2006/main" xmlns:r="http://schemas.openxmlformats.org/officeDocument/2006/relationships" xmlns:p="http://schemas.openxmlformats.org/presentationml/2006/main">
+  <p:cSld>
+    <p:spTree>
+      <p:nvGrpSpPr>
+        <p:cNvPr id="1" name=""/>
+        <p:cNvGrpSpPr/>
+        <p:nvPr/>
+      </p:nvGrpSpPr>
+      <p:grpSpPr>
+        <a:xfrm>
+          <a:off x="0" y="0"/>
+          <a:ext cx="0" cy="0"/>
+          <a:chOff x="0" y="0"/>
+          <a:chExt cx="0" cy="0"/>
+        </a:xfrm>
+      </p:grpSpPr>
+      <p:sp>
+        <p:nvSpPr>
+          <p:cNvPr id="2" name="Title 1">
+            <a:extLst>
+              <a:ext uri="{FF2B5EF4-FFF2-40B4-BE49-F238E27FC236}">
+                <a16:creationId xmlns:a16="http://schemas.microsoft.com/office/drawing/2014/main" id="{E6A2EF3A-542A-3E4F-8D5E-9D7106A933A5}"/>
+              </a:ext>
+            </a:extLst>
+          </p:cNvPr>
+          <p:cNvSpPr>
+            <a:spLocks noGrp="1"/>
+          </p:cNvSpPr>
+          <p:nvPr>
+            <p:ph type="title"/>
+          </p:nvPr>
+        </p:nvSpPr>
+        <p:spPr/>
+        <p:txBody>
+          <a:bodyPr/>
+          <a:lstStyle/>
+          <a:p>
+            <a:pPr algn="ctr"/>
+            <a:r>
+              <a:rPr lang="en-US" b="1" dirty="0"/>
+              <a:t>Beyond Notebooks…</a:t>
+            </a:r>
+          </a:p>
+        </p:txBody>
+      </p:sp>
+      <p:sp>
+        <p:nvSpPr>
+          <p:cNvPr id="3" name="Content Placeholder 2">
+            <a:extLst>
+              <a:ext uri="{FF2B5EF4-FFF2-40B4-BE49-F238E27FC236}">
+                <a16:creationId xmlns:a16="http://schemas.microsoft.com/office/drawing/2014/main" id="{5E84F6A1-708F-0447-96A3-FED3C60A15CE}"/>
+              </a:ext>
+            </a:extLst>
+          </p:cNvPr>
+          <p:cNvSpPr>
+            <a:spLocks noGrp="1"/>
+          </p:cNvSpPr>
+          <p:nvPr>
+            <p:ph idx="1"/>
+          </p:nvPr>
+        </p:nvSpPr>
+        <p:spPr/>
+        <p:txBody>
+          <a:bodyPr/>
+          <a:lstStyle/>
+          <a:p>
+            <a:r>
+              <a:rPr lang="en-US" b="1" dirty="0" err="1"/>
+              <a:t>JupyterLab</a:t>
+            </a:r>
+            <a:r>
+              <a:rPr lang="en-US" dirty="0"/>
+              <a:t> is installed into your containerized repo by default.</a:t>
+            </a:r>
+          </a:p>
+          <a:p>
+            <a:r>
+              <a:rPr lang="en-US" dirty="0"/>
+              <a:t>You can access it by changing the URL you visit to:</a:t>
+            </a:r>
+          </a:p>
+          <a:p>
+            <a:pPr lvl="1"/>
+            <a:r>
+              <a:rPr lang="en-US" b="1" dirty="0"/>
+              <a:t>https://mybinder.org/v2/gh/your-username/my-first-binder/master?urlpath=lab</a:t>
+            </a:r>
+          </a:p>
+          <a:p>
+            <a:r>
+              <a:rPr lang="en-US" dirty="0"/>
+              <a:t>Here you can access:</a:t>
+            </a:r>
+          </a:p>
+          <a:p>
+            <a:pPr lvl="1"/>
+            <a:r>
+              <a:rPr lang="en-US" dirty="0"/>
+              <a:t>Notebooks</a:t>
+            </a:r>
+          </a:p>
+          <a:p>
+            <a:pPr lvl="1"/>
+            <a:r>
+              <a:rPr lang="en-US" dirty="0" err="1"/>
+              <a:t>IPython</a:t>
+            </a:r>
+            <a:r>
+              <a:rPr lang="en-US" dirty="0"/>
+              <a:t> consoles</a:t>
+            </a:r>
+          </a:p>
+          <a:p>
+            <a:pPr lvl="1"/>
+            <a:r>
+              <a:rPr lang="en-US" dirty="0"/>
+              <a:t>Terminals</a:t>
+            </a:r>
+          </a:p>
+          <a:p>
+            <a:pPr lvl="1"/>
+            <a:r>
+              <a:rPr lang="en-US" dirty="0"/>
+              <a:t>A text editor</a:t>
+            </a:r>
+          </a:p>
+          <a:p>
+            <a:r>
+              <a:rPr lang="en-US" dirty="0"/>
+              <a:t>If you use R, you can also open </a:t>
+            </a:r>
+            <a:r>
+              <a:rPr lang="en-US" dirty="0" err="1"/>
+              <a:t>RStudio</a:t>
+            </a:r>
+            <a:r>
+              <a:rPr lang="en-US" dirty="0"/>
+              <a:t> using </a:t>
+            </a:r>
+            <a:r>
+              <a:rPr lang="en-US" sz="2400" dirty="0">
+                <a:latin typeface="Andale Mono" panose="020B0509000000000004" pitchFamily="49" charset="0"/>
+              </a:rPr>
+              <a:t>?</a:t>
+            </a:r>
+            <a:r>
+              <a:rPr lang="en-US" sz="2400" dirty="0" err="1">
+                <a:latin typeface="Andale Mono" panose="020B0509000000000004" pitchFamily="49" charset="0"/>
+              </a:rPr>
+              <a:t>urlpath</a:t>
+            </a:r>
+            <a:r>
+              <a:rPr lang="en-US" sz="2400" dirty="0">
+                <a:latin typeface="Andale Mono" panose="020B0509000000000004" pitchFamily="49" charset="0"/>
+              </a:rPr>
+              <a:t>=</a:t>
+            </a:r>
+            <a:r>
+              <a:rPr lang="en-US" sz="2400" dirty="0" err="1">
+                <a:latin typeface="Andale Mono" panose="020B0509000000000004" pitchFamily="49" charset="0"/>
+              </a:rPr>
+              <a:t>rstudio</a:t>
+            </a:r>
+            <a:endParaRPr lang="en-US" dirty="0">
+              <a:latin typeface="Andale Mono" panose="020B0509000000000004" pitchFamily="49" charset="0"/>
+            </a:endParaRPr>
+          </a:p>
+        </p:txBody>
+      </p:sp>
+    </p:spTree>
+    <p:extLst>
+      <p:ext uri="{BB962C8B-B14F-4D97-AF65-F5344CB8AC3E}">
+        <p14:creationId xmlns:p14="http://schemas.microsoft.com/office/powerpoint/2010/main" val="361472497"/>
+      </p:ext>
+    </p:extLst>
+  </p:cSld>
+  <p:clrMapOvr>
+    <a:masterClrMapping/>
+  </p:clrMapOvr>
+</p:sld>
+</file>
+
 <file path=ppt/slides/slide2.xml><?xml version="1.0" encoding="utf-8"?>
 <p:sld xmlns:a="http://schemas.openxmlformats.org/drawingml/2006/main" xmlns:r="http://schemas.openxmlformats.org/officeDocument/2006/relationships" xmlns:p="http://schemas.openxmlformats.org/presentationml/2006/main">
   <p:cSld>
@@ -4090,7 +4278,7 @@
             <a:pPr lvl="1"/>
             <a:r>
               <a:rPr lang="en-US" dirty="0"/>
-              <a:t>Bad practice           but we’re not collaborating </a:t>
+              <a:t>Bad practice           but we’re not collaborating right now</a:t>
             </a:r>
           </a:p>
           <a:p>
@@ -4131,7 +4319,7 @@
               <a:rPr lang="en-US" dirty="0">
                 <a:sym typeface="Wingdings" pitchFamily="2" charset="2"/>
               </a:rPr>
-              <a:t> creating the instructions that Binder can understand to creating the environment your code needs</a:t>
+              <a:t> creating the instructions that Binder can understand to create the environment your code needs</a:t>
             </a:r>
             <a:endParaRPr lang="en-US" dirty="0"/>
           </a:p>
@@ -4584,6 +4772,1114 @@
     <p:extLst>
       <p:ext uri="{BB962C8B-B14F-4D97-AF65-F5344CB8AC3E}">
         <p14:creationId xmlns:p14="http://schemas.microsoft.com/office/powerpoint/2010/main" val="249245286"/>
+      </p:ext>
+    </p:extLst>
+  </p:cSld>
+  <p:clrMapOvr>
+    <a:masterClrMapping/>
+  </p:clrMapOvr>
+</p:sld>
+</file>
+
+<file path=ppt/slides/slide6.xml><?xml version="1.0" encoding="utf-8"?>
+<p:sld xmlns:a="http://schemas.openxmlformats.org/drawingml/2006/main" xmlns:r="http://schemas.openxmlformats.org/officeDocument/2006/relationships" xmlns:p="http://schemas.openxmlformats.org/presentationml/2006/main">
+  <p:cSld>
+    <p:spTree>
+      <p:nvGrpSpPr>
+        <p:cNvPr id="1" name=""/>
+        <p:cNvGrpSpPr/>
+        <p:nvPr/>
+      </p:nvGrpSpPr>
+      <p:grpSpPr>
+        <a:xfrm>
+          <a:off x="0" y="0"/>
+          <a:ext cx="0" cy="0"/>
+          <a:chOff x="0" y="0"/>
+          <a:chExt cx="0" cy="0"/>
+        </a:xfrm>
+      </p:grpSpPr>
+      <p:sp>
+        <p:nvSpPr>
+          <p:cNvPr id="2" name="Title 1">
+            <a:extLst>
+              <a:ext uri="{FF2B5EF4-FFF2-40B4-BE49-F238E27FC236}">
+                <a16:creationId xmlns:a16="http://schemas.microsoft.com/office/drawing/2014/main" id="{C0BA4549-5683-2E41-BB83-78E87AD0EDA0}"/>
+              </a:ext>
+            </a:extLst>
+          </p:cNvPr>
+          <p:cNvSpPr>
+            <a:spLocks noGrp="1"/>
+          </p:cNvSpPr>
+          <p:nvPr>
+            <p:ph type="title"/>
+          </p:nvPr>
+        </p:nvSpPr>
+        <p:spPr/>
+        <p:txBody>
+          <a:bodyPr/>
+          <a:lstStyle/>
+          <a:p>
+            <a:pPr algn="ctr"/>
+            <a:r>
+              <a:rPr lang="en-US" b="1" dirty="0"/>
+              <a:t>Run </a:t>
+            </a:r>
+            <a:r>
+              <a:rPr lang="en-US" b="1" dirty="0" err="1">
+                <a:latin typeface="Andale Mono" panose="020B0509000000000004" pitchFamily="49" charset="0"/>
+              </a:rPr>
+              <a:t>hello.py</a:t>
+            </a:r>
+            <a:endParaRPr lang="en-US" b="1" dirty="0">
+              <a:latin typeface="Andale Mono" panose="020B0509000000000004" pitchFamily="49" charset="0"/>
+            </a:endParaRPr>
+          </a:p>
+        </p:txBody>
+      </p:sp>
+      <p:sp>
+        <p:nvSpPr>
+          <p:cNvPr id="3" name="Content Placeholder 2">
+            <a:extLst>
+              <a:ext uri="{FF2B5EF4-FFF2-40B4-BE49-F238E27FC236}">
+                <a16:creationId xmlns:a16="http://schemas.microsoft.com/office/drawing/2014/main" id="{62EA457B-C3E4-DE4E-ADAF-6CC3BD83D45A}"/>
+              </a:ext>
+            </a:extLst>
+          </p:cNvPr>
+          <p:cNvSpPr>
+            <a:spLocks noGrp="1"/>
+          </p:cNvSpPr>
+          <p:nvPr>
+            <p:ph idx="1"/>
+          </p:nvPr>
+        </p:nvSpPr>
+        <p:spPr>
+          <a:xfrm>
+            <a:off x="838200" y="1825625"/>
+            <a:ext cx="9405257" cy="4351338"/>
+          </a:xfrm>
+        </p:spPr>
+        <p:txBody>
+          <a:bodyPr/>
+          <a:lstStyle/>
+          <a:p>
+            <a:pPr marL="0" indent="0">
+              <a:buNone/>
+            </a:pPr>
+            <a:r>
+              <a:rPr lang="en-US" dirty="0"/>
+              <a:t>If everything ran smoothly, you’ll see a </a:t>
+            </a:r>
+            <a:r>
+              <a:rPr lang="en-US" dirty="0" err="1"/>
+              <a:t>Jupyter</a:t>
+            </a:r>
+            <a:r>
+              <a:rPr lang="en-US" dirty="0"/>
+              <a:t> Notebook interface.</a:t>
+            </a:r>
+          </a:p>
+          <a:p>
+            <a:pPr marL="0" indent="0">
+              <a:buNone/>
+            </a:pPr>
+            <a:endParaRPr lang="en-US" dirty="0"/>
+          </a:p>
+          <a:p>
+            <a:pPr marL="0" indent="0">
+              <a:buNone/>
+            </a:pPr>
+            <a:r>
+              <a:rPr lang="en-US" b="1" dirty="0"/>
+              <a:t>TO DO:</a:t>
+            </a:r>
+          </a:p>
+          <a:p>
+            <a:pPr marL="514350" indent="-514350">
+              <a:buFont typeface="+mj-lt"/>
+              <a:buAutoNum type="arabicPeriod"/>
+            </a:pPr>
+            <a:r>
+              <a:rPr lang="en-US" dirty="0"/>
+              <a:t>In the top right corner click “New” </a:t>
+            </a:r>
+            <a:r>
+              <a:rPr lang="en-US" dirty="0">
+                <a:sym typeface="Wingdings" pitchFamily="2" charset="2"/>
+              </a:rPr>
+              <a:t> “Terminal”</a:t>
+            </a:r>
+          </a:p>
+          <a:p>
+            <a:pPr marL="514350" indent="-514350">
+              <a:buFont typeface="+mj-lt"/>
+              <a:buAutoNum type="arabicPeriod"/>
+            </a:pPr>
+            <a:r>
+              <a:rPr lang="en-US" dirty="0">
+                <a:sym typeface="Wingdings" pitchFamily="2" charset="2"/>
+              </a:rPr>
+              <a:t>In the new tab with the terminal, type </a:t>
+            </a:r>
+            <a:r>
+              <a:rPr lang="en-US" sz="2400" dirty="0">
+                <a:latin typeface="Andale Mono" panose="020B0509000000000004" pitchFamily="49" charset="0"/>
+                <a:sym typeface="Wingdings" pitchFamily="2" charset="2"/>
+              </a:rPr>
+              <a:t>python </a:t>
+            </a:r>
+            <a:r>
+              <a:rPr lang="en-US" sz="2400" dirty="0" err="1">
+                <a:latin typeface="Andale Mono" panose="020B0509000000000004" pitchFamily="49" charset="0"/>
+                <a:sym typeface="Wingdings" pitchFamily="2" charset="2"/>
+              </a:rPr>
+              <a:t>hello.py</a:t>
+            </a:r>
+            <a:r>
+              <a:rPr lang="en-US" dirty="0">
+                <a:sym typeface="Wingdings" pitchFamily="2" charset="2"/>
+              </a:rPr>
+              <a:t> and press return</a:t>
+            </a:r>
+            <a:endParaRPr lang="en-US" dirty="0"/>
+          </a:p>
+        </p:txBody>
+      </p:sp>
+      <p:pic>
+        <p:nvPicPr>
+          <p:cNvPr id="4" name="Picture 3" descr="Clipart - SMIL animation Verkehrslichtsignalanlage">
+            <a:extLst>
+              <a:ext uri="{FF2B5EF4-FFF2-40B4-BE49-F238E27FC236}">
+                <a16:creationId xmlns:a16="http://schemas.microsoft.com/office/drawing/2014/main" id="{5CC61F0E-C716-984D-9329-BD93427BDFFD}"/>
+              </a:ext>
+            </a:extLst>
+          </p:cNvPr>
+          <p:cNvPicPr>
+            <a:picLocks noChangeAspect="1"/>
+          </p:cNvPicPr>
+          <p:nvPr/>
+        </p:nvPicPr>
+        <p:blipFill rotWithShape="1">
+          <a:blip r:embed="rId2">
+            <a:extLst>
+              <a:ext uri="{837473B0-CC2E-450A-ABE3-18F120FF3D39}">
+                <a1611:picAttrSrcUrl xmlns:a1611="http://schemas.microsoft.com/office/drawing/2016/11/main" r:id="rId3"/>
+              </a:ext>
+            </a:extLst>
+          </a:blip>
+          <a:srcRect l="26721" r="26818"/>
+          <a:stretch/>
+        </p:blipFill>
+        <p:spPr>
+          <a:xfrm>
+            <a:off x="10367963" y="74254"/>
+            <a:ext cx="985837" cy="2832818"/>
+          </a:xfrm>
+          <a:prstGeom prst="rect">
+            <a:avLst/>
+          </a:prstGeom>
+        </p:spPr>
+      </p:pic>
+    </p:spTree>
+    <p:extLst>
+      <p:ext uri="{BB962C8B-B14F-4D97-AF65-F5344CB8AC3E}">
+        <p14:creationId xmlns:p14="http://schemas.microsoft.com/office/powerpoint/2010/main" val="2631139190"/>
+      </p:ext>
+    </p:extLst>
+  </p:cSld>
+  <p:clrMapOvr>
+    <a:masterClrMapping/>
+  </p:clrMapOvr>
+</p:sld>
+</file>
+
+<file path=ppt/slides/slide7.xml><?xml version="1.0" encoding="utf-8"?>
+<p:sld xmlns:a="http://schemas.openxmlformats.org/drawingml/2006/main" xmlns:r="http://schemas.openxmlformats.org/officeDocument/2006/relationships" xmlns:p="http://schemas.openxmlformats.org/presentationml/2006/main">
+  <p:cSld>
+    <p:spTree>
+      <p:nvGrpSpPr>
+        <p:cNvPr id="1" name=""/>
+        <p:cNvGrpSpPr/>
+        <p:nvPr/>
+      </p:nvGrpSpPr>
+      <p:grpSpPr>
+        <a:xfrm>
+          <a:off x="0" y="0"/>
+          <a:ext cx="0" cy="0"/>
+          <a:chOff x="0" y="0"/>
+          <a:chExt cx="0" cy="0"/>
+        </a:xfrm>
+      </p:grpSpPr>
+      <p:sp>
+        <p:nvSpPr>
+          <p:cNvPr id="2" name="Title 1">
+            <a:extLst>
+              <a:ext uri="{FF2B5EF4-FFF2-40B4-BE49-F238E27FC236}">
+                <a16:creationId xmlns:a16="http://schemas.microsoft.com/office/drawing/2014/main" id="{54C3263E-AAD2-4945-AA0E-867A7024DA6D}"/>
+              </a:ext>
+            </a:extLst>
+          </p:cNvPr>
+          <p:cNvSpPr>
+            <a:spLocks noGrp="1"/>
+          </p:cNvSpPr>
+          <p:nvPr>
+            <p:ph type="title"/>
+          </p:nvPr>
+        </p:nvSpPr>
+        <p:spPr/>
+        <p:txBody>
+          <a:bodyPr/>
+          <a:lstStyle/>
+          <a:p>
+            <a:pPr algn="ctr"/>
+            <a:r>
+              <a:rPr lang="en-US" b="1" dirty="0"/>
+              <a:t>Pinning Dependencies</a:t>
+            </a:r>
+          </a:p>
+        </p:txBody>
+      </p:sp>
+      <p:sp>
+        <p:nvSpPr>
+          <p:cNvPr id="3" name="Content Placeholder 2">
+            <a:extLst>
+              <a:ext uri="{FF2B5EF4-FFF2-40B4-BE49-F238E27FC236}">
+                <a16:creationId xmlns:a16="http://schemas.microsoft.com/office/drawing/2014/main" id="{1E96C9C5-3380-6146-92C1-CC9CD7EDDD7A}"/>
+              </a:ext>
+            </a:extLst>
+          </p:cNvPr>
+          <p:cNvSpPr>
+            <a:spLocks noGrp="1"/>
+          </p:cNvSpPr>
+          <p:nvPr>
+            <p:ph idx="1"/>
+          </p:nvPr>
+        </p:nvSpPr>
+        <p:spPr>
+          <a:xfrm>
+            <a:off x="838200" y="1825625"/>
+            <a:ext cx="8175171" cy="4351338"/>
+          </a:xfrm>
+        </p:spPr>
+        <p:txBody>
+          <a:bodyPr>
+            <a:normAutofit fontScale="85000" lnSpcReduction="10000"/>
+          </a:bodyPr>
+          <a:lstStyle/>
+          <a:p>
+            <a:pPr marL="0" indent="0">
+              <a:buNone/>
+            </a:pPr>
+            <a:r>
+              <a:rPr lang="en-US" dirty="0"/>
+              <a:t>It was easy to get started, but our environment is barebones – let’s add a dependency!</a:t>
+            </a:r>
+          </a:p>
+          <a:p>
+            <a:pPr marL="0" indent="0">
+              <a:buNone/>
+            </a:pPr>
+            <a:endParaRPr lang="en-US" dirty="0"/>
+          </a:p>
+          <a:p>
+            <a:pPr marL="0" indent="0">
+              <a:buNone/>
+            </a:pPr>
+            <a:r>
+              <a:rPr lang="en-US" b="1" dirty="0"/>
+              <a:t>TO DO:</a:t>
+            </a:r>
+          </a:p>
+          <a:p>
+            <a:pPr marL="514350" indent="-514350">
+              <a:buFont typeface="+mj-lt"/>
+              <a:buAutoNum type="arabicPeriod"/>
+            </a:pPr>
+            <a:r>
+              <a:rPr lang="en-US" dirty="0"/>
+              <a:t>In your repo, create a file called </a:t>
+            </a:r>
+            <a:r>
+              <a:rPr lang="en-US" sz="2400" dirty="0" err="1">
+                <a:latin typeface="Andale Mono" panose="020B0509000000000004" pitchFamily="49" charset="0"/>
+              </a:rPr>
+              <a:t>requirements.txt</a:t>
+            </a:r>
+            <a:endParaRPr lang="en-US" dirty="0">
+              <a:latin typeface="Andale Mono" panose="020B0509000000000004" pitchFamily="49" charset="0"/>
+            </a:endParaRPr>
+          </a:p>
+          <a:p>
+            <a:pPr marL="514350" indent="-514350">
+              <a:buFont typeface="+mj-lt"/>
+              <a:buAutoNum type="arabicPeriod"/>
+            </a:pPr>
+            <a:r>
+              <a:rPr lang="en-US" dirty="0"/>
+              <a:t>Add a line that says: </a:t>
+            </a:r>
+            <a:r>
+              <a:rPr lang="en-US" sz="2400" dirty="0" err="1">
+                <a:latin typeface="Andale Mono" panose="020B0509000000000004" pitchFamily="49" charset="0"/>
+              </a:rPr>
+              <a:t>numpy</a:t>
+            </a:r>
+            <a:r>
+              <a:rPr lang="en-US" sz="2400" dirty="0">
+                <a:latin typeface="Andale Mono" panose="020B0509000000000004" pitchFamily="49" charset="0"/>
+              </a:rPr>
+              <a:t>==1.14.5</a:t>
+            </a:r>
+            <a:endParaRPr lang="en-US" dirty="0">
+              <a:latin typeface="Andale Mono" panose="020B0509000000000004" pitchFamily="49" charset="0"/>
+            </a:endParaRPr>
+          </a:p>
+          <a:p>
+            <a:pPr marL="514350" indent="-514350">
+              <a:buFont typeface="+mj-lt"/>
+              <a:buAutoNum type="arabicPeriod"/>
+            </a:pPr>
+            <a:r>
+              <a:rPr lang="en-US" dirty="0"/>
+              <a:t>Check for typos!</a:t>
+            </a:r>
+          </a:p>
+          <a:p>
+            <a:pPr marL="514350" indent="-514350">
+              <a:buFont typeface="+mj-lt"/>
+              <a:buAutoNum type="arabicPeriod"/>
+            </a:pPr>
+            <a:r>
+              <a:rPr lang="en-US" dirty="0"/>
+              <a:t>Visit </a:t>
+            </a:r>
+            <a:r>
+              <a:rPr lang="en-US" b="1" dirty="0"/>
+              <a:t>https://mybinder.org/v2/gh/your-username/my-first-binder/master</a:t>
+            </a:r>
+            <a:r>
+              <a:rPr lang="en-US" dirty="0"/>
+              <a:t> again in a new tab</a:t>
+            </a:r>
+          </a:p>
+          <a:p>
+            <a:pPr lvl="1"/>
+            <a:r>
+              <a:rPr lang="en-US" dirty="0"/>
+              <a:t>This time, click on “Build Logs” in the big, horizontal, grey bar. This will let you watch the progress of your build. It’s useful when your build fails or something you think should be installed is missing.</a:t>
+            </a:r>
+          </a:p>
+        </p:txBody>
+      </p:sp>
+      <p:pic>
+        <p:nvPicPr>
+          <p:cNvPr id="4" name="Picture 3" descr="Clipart - SMIL animation Verkehrslichtsignalanlage">
+            <a:extLst>
+              <a:ext uri="{FF2B5EF4-FFF2-40B4-BE49-F238E27FC236}">
+                <a16:creationId xmlns:a16="http://schemas.microsoft.com/office/drawing/2014/main" id="{481ECE9E-74B1-EC4D-A088-3E4DF08B7AAA}"/>
+              </a:ext>
+            </a:extLst>
+          </p:cNvPr>
+          <p:cNvPicPr>
+            <a:picLocks noChangeAspect="1"/>
+          </p:cNvPicPr>
+          <p:nvPr/>
+        </p:nvPicPr>
+        <p:blipFill rotWithShape="1">
+          <a:blip r:embed="rId2">
+            <a:extLst>
+              <a:ext uri="{837473B0-CC2E-450A-ABE3-18F120FF3D39}">
+                <a1611:picAttrSrcUrl xmlns:a1611="http://schemas.microsoft.com/office/drawing/2016/11/main" r:id="rId3"/>
+              </a:ext>
+            </a:extLst>
+          </a:blip>
+          <a:srcRect l="26721" r="26818"/>
+          <a:stretch/>
+        </p:blipFill>
+        <p:spPr>
+          <a:xfrm>
+            <a:off x="10367963" y="74254"/>
+            <a:ext cx="985837" cy="2832818"/>
+          </a:xfrm>
+          <a:prstGeom prst="rect">
+            <a:avLst/>
+          </a:prstGeom>
+        </p:spPr>
+      </p:pic>
+      <p:sp>
+        <p:nvSpPr>
+          <p:cNvPr id="5" name="TextBox 4">
+            <a:extLst>
+              <a:ext uri="{FF2B5EF4-FFF2-40B4-BE49-F238E27FC236}">
+                <a16:creationId xmlns:a16="http://schemas.microsoft.com/office/drawing/2014/main" id="{47EC5B49-6D51-AF4C-B2F1-F0F6BE3CEB9E}"/>
+              </a:ext>
+            </a:extLst>
+          </p:cNvPr>
+          <p:cNvSpPr txBox="1"/>
+          <p:nvPr/>
+        </p:nvSpPr>
+        <p:spPr>
+          <a:xfrm>
+            <a:off x="9133114" y="5192485"/>
+            <a:ext cx="2928257" cy="1477328"/>
+          </a:xfrm>
+          <a:prstGeom prst="rect">
+            <a:avLst/>
+          </a:prstGeom>
+        </p:spPr>
+        <p:style>
+          <a:lnRef idx="1">
+            <a:schemeClr val="accent4"/>
+          </a:lnRef>
+          <a:fillRef idx="2">
+            <a:schemeClr val="accent4"/>
+          </a:fillRef>
+          <a:effectRef idx="1">
+            <a:schemeClr val="accent4"/>
+          </a:effectRef>
+          <a:fontRef idx="minor">
+            <a:schemeClr val="dk1"/>
+          </a:fontRef>
+        </p:style>
+        <p:txBody>
+          <a:bodyPr wrap="square" rtlCol="0">
+            <a:spAutoFit/>
+          </a:bodyPr>
+          <a:lstStyle/>
+          <a:p>
+            <a:r>
+              <a:rPr lang="en-US" b="1" dirty="0"/>
+              <a:t>Background Box!</a:t>
+            </a:r>
+          </a:p>
+          <a:p>
+            <a:r>
+              <a:rPr lang="en-US" dirty="0"/>
+              <a:t>This time, </a:t>
+            </a:r>
+            <a:r>
+              <a:rPr lang="en-US" dirty="0" err="1"/>
+              <a:t>BinderHub</a:t>
+            </a:r>
+            <a:r>
+              <a:rPr lang="en-US" dirty="0"/>
+              <a:t> will read </a:t>
+            </a:r>
+            <a:r>
+              <a:rPr lang="en-US" sz="1600" dirty="0" err="1">
+                <a:latin typeface="Andale Mono" panose="020B0509000000000004" pitchFamily="49" charset="0"/>
+              </a:rPr>
+              <a:t>requirements.txt</a:t>
+            </a:r>
+            <a:r>
+              <a:rPr lang="en-US" sz="1600" dirty="0">
+                <a:latin typeface="Andale Mono" panose="020B0509000000000004" pitchFamily="49" charset="0"/>
+              </a:rPr>
+              <a:t> </a:t>
+            </a:r>
+            <a:r>
+              <a:rPr lang="en-US" dirty="0"/>
+              <a:t>and install version 1.14.5 of the </a:t>
+            </a:r>
+            <a:r>
+              <a:rPr lang="en-US" sz="1600" dirty="0" err="1">
+                <a:latin typeface="Andale Mono" panose="020B0509000000000004" pitchFamily="49" charset="0"/>
+              </a:rPr>
+              <a:t>numpy</a:t>
+            </a:r>
+            <a:r>
+              <a:rPr lang="en-US" dirty="0"/>
+              <a:t> package</a:t>
+            </a:r>
+          </a:p>
+        </p:txBody>
+      </p:sp>
+    </p:spTree>
+    <p:extLst>
+      <p:ext uri="{BB962C8B-B14F-4D97-AF65-F5344CB8AC3E}">
+        <p14:creationId xmlns:p14="http://schemas.microsoft.com/office/powerpoint/2010/main" val="305164130"/>
+      </p:ext>
+    </p:extLst>
+  </p:cSld>
+  <p:clrMapOvr>
+    <a:masterClrMapping/>
+  </p:clrMapOvr>
+</p:sld>
+</file>
+
+<file path=ppt/slides/slide8.xml><?xml version="1.0" encoding="utf-8"?>
+<p:sld xmlns:a="http://schemas.openxmlformats.org/drawingml/2006/main" xmlns:r="http://schemas.openxmlformats.org/officeDocument/2006/relationships" xmlns:p="http://schemas.openxmlformats.org/presentationml/2006/main">
+  <p:cSld>
+    <p:spTree>
+      <p:nvGrpSpPr>
+        <p:cNvPr id="1" name=""/>
+        <p:cNvGrpSpPr/>
+        <p:nvPr/>
+      </p:nvGrpSpPr>
+      <p:grpSpPr>
+        <a:xfrm>
+          <a:off x="0" y="0"/>
+          <a:ext cx="0" cy="0"/>
+          <a:chOff x="0" y="0"/>
+          <a:chExt cx="0" cy="0"/>
+        </a:xfrm>
+      </p:grpSpPr>
+      <p:sp>
+        <p:nvSpPr>
+          <p:cNvPr id="2" name="Title 1">
+            <a:extLst>
+              <a:ext uri="{FF2B5EF4-FFF2-40B4-BE49-F238E27FC236}">
+                <a16:creationId xmlns:a16="http://schemas.microsoft.com/office/drawing/2014/main" id="{2BB2C05B-96DF-9945-A974-00ED028B677C}"/>
+              </a:ext>
+            </a:extLst>
+          </p:cNvPr>
+          <p:cNvSpPr>
+            <a:spLocks noGrp="1"/>
+          </p:cNvSpPr>
+          <p:nvPr>
+            <p:ph type="title"/>
+          </p:nvPr>
+        </p:nvSpPr>
+        <p:spPr/>
+        <p:txBody>
+          <a:bodyPr/>
+          <a:lstStyle/>
+          <a:p>
+            <a:pPr algn="ctr"/>
+            <a:r>
+              <a:rPr lang="en-US" b="1" dirty="0"/>
+              <a:t>Check the Environment</a:t>
+            </a:r>
+          </a:p>
+        </p:txBody>
+      </p:sp>
+      <p:sp>
+        <p:nvSpPr>
+          <p:cNvPr id="3" name="Content Placeholder 2">
+            <a:extLst>
+              <a:ext uri="{FF2B5EF4-FFF2-40B4-BE49-F238E27FC236}">
+                <a16:creationId xmlns:a16="http://schemas.microsoft.com/office/drawing/2014/main" id="{268D46FF-E2BC-314C-BFCF-5C05C9CB4ADE}"/>
+              </a:ext>
+            </a:extLst>
+          </p:cNvPr>
+          <p:cNvSpPr>
+            <a:spLocks noGrp="1"/>
+          </p:cNvSpPr>
+          <p:nvPr>
+            <p:ph idx="1"/>
+          </p:nvPr>
+        </p:nvSpPr>
+        <p:spPr>
+          <a:xfrm>
+            <a:off x="838200" y="1825625"/>
+            <a:ext cx="9742714" cy="4351338"/>
+          </a:xfrm>
+        </p:spPr>
+        <p:txBody>
+          <a:bodyPr>
+            <a:normAutofit lnSpcReduction="10000"/>
+          </a:bodyPr>
+          <a:lstStyle/>
+          <a:p>
+            <a:pPr marL="0" indent="0">
+              <a:buNone/>
+            </a:pPr>
+            <a:r>
+              <a:rPr lang="en-US" b="1" dirty="0"/>
+              <a:t>TO DO:</a:t>
+            </a:r>
+          </a:p>
+          <a:p>
+            <a:pPr marL="514350" indent="-514350">
+              <a:buFont typeface="+mj-lt"/>
+              <a:buAutoNum type="arabicPeriod"/>
+            </a:pPr>
+            <a:r>
+              <a:rPr lang="en-US" dirty="0"/>
+              <a:t>In the top right corner of the </a:t>
+            </a:r>
+            <a:r>
+              <a:rPr lang="en-US" dirty="0" err="1"/>
+              <a:t>Jupyter</a:t>
+            </a:r>
+            <a:r>
+              <a:rPr lang="en-US" dirty="0"/>
+              <a:t> Notebook window, click “New” </a:t>
+            </a:r>
+            <a:r>
+              <a:rPr lang="en-US" dirty="0">
+                <a:sym typeface="Wingdings" pitchFamily="2" charset="2"/>
+              </a:rPr>
+              <a:t> “Python 3” to open a new Notebook</a:t>
+            </a:r>
+          </a:p>
+          <a:p>
+            <a:pPr marL="514350" indent="-514350">
+              <a:buFont typeface="+mj-lt"/>
+              <a:buAutoNum type="arabicPeriod"/>
+            </a:pPr>
+            <a:r>
+              <a:rPr lang="en-US" dirty="0">
+                <a:sym typeface="Wingdings" pitchFamily="2" charset="2"/>
+              </a:rPr>
+              <a:t>Type the following into a new cell:</a:t>
+            </a:r>
+          </a:p>
+          <a:p>
+            <a:pPr marL="0" indent="0">
+              <a:buNone/>
+            </a:pPr>
+            <a:endParaRPr lang="en-US" dirty="0">
+              <a:sym typeface="Wingdings" pitchFamily="2" charset="2"/>
+            </a:endParaRPr>
+          </a:p>
+          <a:p>
+            <a:pPr marL="0" indent="0">
+              <a:buNone/>
+            </a:pPr>
+            <a:endParaRPr lang="en-US" dirty="0">
+              <a:sym typeface="Wingdings" pitchFamily="2" charset="2"/>
+            </a:endParaRPr>
+          </a:p>
+          <a:p>
+            <a:pPr marL="0" indent="0">
+              <a:buNone/>
+            </a:pPr>
+            <a:endParaRPr lang="en-US" dirty="0">
+              <a:sym typeface="Wingdings" pitchFamily="2" charset="2"/>
+            </a:endParaRPr>
+          </a:p>
+          <a:p>
+            <a:pPr marL="514350" indent="-514350">
+              <a:buFont typeface="+mj-lt"/>
+              <a:buAutoNum type="arabicPeriod" startAt="3"/>
+            </a:pPr>
+            <a:r>
+              <a:rPr lang="en-US" dirty="0">
+                <a:sym typeface="Wingdings" pitchFamily="2" charset="2"/>
+              </a:rPr>
+              <a:t>Run the cell to see the version number and a random number printed out</a:t>
+            </a:r>
+          </a:p>
+          <a:p>
+            <a:pPr lvl="1"/>
+            <a:r>
+              <a:rPr lang="en-US" dirty="0">
+                <a:sym typeface="Wingdings" pitchFamily="2" charset="2"/>
+              </a:rPr>
+              <a:t>Press either SHIFT+RETURN or the “Run” button in the Menu bar</a:t>
+            </a:r>
+          </a:p>
+        </p:txBody>
+      </p:sp>
+      <p:sp>
+        <p:nvSpPr>
+          <p:cNvPr id="4" name="TextBox 3">
+            <a:extLst>
+              <a:ext uri="{FF2B5EF4-FFF2-40B4-BE49-F238E27FC236}">
+                <a16:creationId xmlns:a16="http://schemas.microsoft.com/office/drawing/2014/main" id="{8D91E100-6BCF-D64C-945F-6138ED5EA5F3}"/>
+              </a:ext>
+            </a:extLst>
+          </p:cNvPr>
+          <p:cNvSpPr txBox="1"/>
+          <p:nvPr/>
+        </p:nvSpPr>
+        <p:spPr>
+          <a:xfrm>
+            <a:off x="1828800" y="3559629"/>
+            <a:ext cx="4608954" cy="1200329"/>
+          </a:xfrm>
+          <a:prstGeom prst="rect">
+            <a:avLst/>
+          </a:prstGeom>
+          <a:noFill/>
+        </p:spPr>
+        <p:txBody>
+          <a:bodyPr wrap="none" rtlCol="0">
+            <a:spAutoFit/>
+          </a:bodyPr>
+          <a:lstStyle/>
+          <a:p>
+            <a:r>
+              <a:rPr lang="en-US" sz="2400" dirty="0">
+                <a:latin typeface="Andale Mono" panose="020B0509000000000004" pitchFamily="49" charset="0"/>
+              </a:rPr>
+              <a:t>import </a:t>
+            </a:r>
+            <a:r>
+              <a:rPr lang="en-US" sz="2400" dirty="0" err="1">
+                <a:latin typeface="Andale Mono" panose="020B0509000000000004" pitchFamily="49" charset="0"/>
+              </a:rPr>
+              <a:t>numpy</a:t>
+            </a:r>
+            <a:endParaRPr lang="en-US" sz="2400" dirty="0">
+              <a:latin typeface="Andale Mono" panose="020B0509000000000004" pitchFamily="49" charset="0"/>
+            </a:endParaRPr>
+          </a:p>
+          <a:p>
+            <a:r>
+              <a:rPr lang="en-US" sz="2400" dirty="0">
+                <a:latin typeface="Andale Mono" panose="020B0509000000000004" pitchFamily="49" charset="0"/>
+              </a:rPr>
+              <a:t>print(</a:t>
+            </a:r>
+            <a:r>
+              <a:rPr lang="en-US" sz="2400" dirty="0" err="1">
+                <a:latin typeface="Andale Mono" panose="020B0509000000000004" pitchFamily="49" charset="0"/>
+              </a:rPr>
+              <a:t>numpy</a:t>
+            </a:r>
+            <a:r>
+              <a:rPr lang="en-US" sz="2400" dirty="0">
+                <a:latin typeface="Andale Mono" panose="020B0509000000000004" pitchFamily="49" charset="0"/>
+              </a:rPr>
+              <a:t>.__version__)</a:t>
+            </a:r>
+          </a:p>
+          <a:p>
+            <a:r>
+              <a:rPr lang="en-US" sz="2400" dirty="0" err="1">
+                <a:latin typeface="Andale Mono" panose="020B0509000000000004" pitchFamily="49" charset="0"/>
+              </a:rPr>
+              <a:t>numpy.random.randn</a:t>
+            </a:r>
+            <a:r>
+              <a:rPr lang="en-US" sz="2400" dirty="0">
+                <a:latin typeface="Andale Mono" panose="020B0509000000000004" pitchFamily="49" charset="0"/>
+              </a:rPr>
+              <a:t>()</a:t>
+            </a:r>
+          </a:p>
+        </p:txBody>
+      </p:sp>
+      <p:sp>
+        <p:nvSpPr>
+          <p:cNvPr id="5" name="TextBox 4">
+            <a:extLst>
+              <a:ext uri="{FF2B5EF4-FFF2-40B4-BE49-F238E27FC236}">
+                <a16:creationId xmlns:a16="http://schemas.microsoft.com/office/drawing/2014/main" id="{712E2C45-CCA2-134D-A5E4-45B303FF7D11}"/>
+              </a:ext>
+            </a:extLst>
+          </p:cNvPr>
+          <p:cNvSpPr txBox="1"/>
+          <p:nvPr/>
+        </p:nvSpPr>
+        <p:spPr>
+          <a:xfrm>
+            <a:off x="6437754" y="4001294"/>
+            <a:ext cx="3303981" cy="369332"/>
+          </a:xfrm>
+          <a:prstGeom prst="rect">
+            <a:avLst/>
+          </a:prstGeom>
+          <a:noFill/>
+        </p:spPr>
+        <p:txBody>
+          <a:bodyPr wrap="none" rtlCol="0">
+            <a:spAutoFit/>
+          </a:bodyPr>
+          <a:lstStyle/>
+          <a:p>
+            <a:r>
+              <a:rPr lang="en-US" b="1" dirty="0">
+                <a:sym typeface="Wingdings" pitchFamily="2" charset="2"/>
+              </a:rPr>
+              <a:t> 2 underscores either side! “_”</a:t>
+            </a:r>
+            <a:endParaRPr lang="en-US" b="1" dirty="0"/>
+          </a:p>
+        </p:txBody>
+      </p:sp>
+      <p:pic>
+        <p:nvPicPr>
+          <p:cNvPr id="6" name="Picture 5" descr="Clipart - SMIL animation Verkehrslichtsignalanlage">
+            <a:extLst>
+              <a:ext uri="{FF2B5EF4-FFF2-40B4-BE49-F238E27FC236}">
+                <a16:creationId xmlns:a16="http://schemas.microsoft.com/office/drawing/2014/main" id="{905F7E68-D629-E141-B33E-3B232FB380E1}"/>
+              </a:ext>
+            </a:extLst>
+          </p:cNvPr>
+          <p:cNvPicPr>
+            <a:picLocks noChangeAspect="1"/>
+          </p:cNvPicPr>
+          <p:nvPr/>
+        </p:nvPicPr>
+        <p:blipFill rotWithShape="1">
+          <a:blip r:embed="rId2">
+            <a:extLst>
+              <a:ext uri="{837473B0-CC2E-450A-ABE3-18F120FF3D39}">
+                <a1611:picAttrSrcUrl xmlns:a1611="http://schemas.microsoft.com/office/drawing/2016/11/main" r:id="rId3"/>
+              </a:ext>
+            </a:extLst>
+          </a:blip>
+          <a:srcRect l="26721" r="26818"/>
+          <a:stretch/>
+        </p:blipFill>
+        <p:spPr>
+          <a:xfrm>
+            <a:off x="10367963" y="74254"/>
+            <a:ext cx="985837" cy="2832818"/>
+          </a:xfrm>
+          <a:prstGeom prst="rect">
+            <a:avLst/>
+          </a:prstGeom>
+        </p:spPr>
+      </p:pic>
+    </p:spTree>
+    <p:extLst>
+      <p:ext uri="{BB962C8B-B14F-4D97-AF65-F5344CB8AC3E}">
+        <p14:creationId xmlns:p14="http://schemas.microsoft.com/office/powerpoint/2010/main" val="1436326243"/>
+      </p:ext>
+    </p:extLst>
+  </p:cSld>
+  <p:clrMapOvr>
+    <a:masterClrMapping/>
+  </p:clrMapOvr>
+</p:sld>
+</file>
+
+<file path=ppt/slides/slide9.xml><?xml version="1.0" encoding="utf-8"?>
+<p:sld xmlns:a="http://schemas.openxmlformats.org/drawingml/2006/main" xmlns:r="http://schemas.openxmlformats.org/officeDocument/2006/relationships" xmlns:p="http://schemas.openxmlformats.org/presentationml/2006/main">
+  <p:cSld>
+    <p:spTree>
+      <p:nvGrpSpPr>
+        <p:cNvPr id="1" name=""/>
+        <p:cNvGrpSpPr/>
+        <p:nvPr/>
+      </p:nvGrpSpPr>
+      <p:grpSpPr>
+        <a:xfrm>
+          <a:off x="0" y="0"/>
+          <a:ext cx="0" cy="0"/>
+          <a:chOff x="0" y="0"/>
+          <a:chExt cx="0" cy="0"/>
+        </a:xfrm>
+      </p:grpSpPr>
+      <p:sp>
+        <p:nvSpPr>
+          <p:cNvPr id="2" name="Title 1">
+            <a:extLst>
+              <a:ext uri="{FF2B5EF4-FFF2-40B4-BE49-F238E27FC236}">
+                <a16:creationId xmlns:a16="http://schemas.microsoft.com/office/drawing/2014/main" id="{14F1F1E8-9AE0-A74B-BD10-9AFDEBE4A25D}"/>
+              </a:ext>
+            </a:extLst>
+          </p:cNvPr>
+          <p:cNvSpPr>
+            <a:spLocks noGrp="1"/>
+          </p:cNvSpPr>
+          <p:nvPr>
+            <p:ph type="title"/>
+          </p:nvPr>
+        </p:nvSpPr>
+        <p:spPr/>
+        <p:txBody>
+          <a:bodyPr/>
+          <a:lstStyle/>
+          <a:p>
+            <a:pPr algn="ctr"/>
+            <a:r>
+              <a:rPr lang="en-US" b="1" dirty="0"/>
+              <a:t>Sharing your Work</a:t>
+            </a:r>
+          </a:p>
+        </p:txBody>
+      </p:sp>
+      <p:sp>
+        <p:nvSpPr>
+          <p:cNvPr id="3" name="Content Placeholder 2">
+            <a:extLst>
+              <a:ext uri="{FF2B5EF4-FFF2-40B4-BE49-F238E27FC236}">
+                <a16:creationId xmlns:a16="http://schemas.microsoft.com/office/drawing/2014/main" id="{D26DF004-4532-D24F-A0D3-E11332B4F903}"/>
+              </a:ext>
+            </a:extLst>
+          </p:cNvPr>
+          <p:cNvSpPr>
+            <a:spLocks noGrp="1"/>
+          </p:cNvSpPr>
+          <p:nvPr>
+            <p:ph idx="1"/>
+          </p:nvPr>
+        </p:nvSpPr>
+        <p:spPr>
+          <a:xfrm>
+            <a:off x="838200" y="1825625"/>
+            <a:ext cx="9383486" cy="4351338"/>
+          </a:xfrm>
+        </p:spPr>
+        <p:txBody>
+          <a:bodyPr>
+            <a:normAutofit fontScale="85000" lnSpcReduction="20000"/>
+          </a:bodyPr>
+          <a:lstStyle/>
+          <a:p>
+            <a:pPr marL="0" indent="0">
+              <a:buNone/>
+            </a:pPr>
+            <a:r>
+              <a:rPr lang="en-US" dirty="0"/>
+              <a:t>Binder is all about sharing your work easily and there are two ways to do it:</a:t>
+            </a:r>
+          </a:p>
+          <a:p>
+            <a:r>
+              <a:rPr lang="en-US" dirty="0"/>
+              <a:t>Share the </a:t>
+            </a:r>
+            <a:r>
+              <a:rPr lang="en-US" b="1" dirty="0"/>
+              <a:t>https://mybinder.org/v2/gh/your-username/my-first-binder/master </a:t>
+            </a:r>
+            <a:r>
+              <a:rPr lang="en-US" dirty="0"/>
+              <a:t>URL directly</a:t>
+            </a:r>
+          </a:p>
+          <a:p>
+            <a:r>
+              <a:rPr lang="en-US" dirty="0"/>
+              <a:t>Visit </a:t>
+            </a:r>
+            <a:r>
+              <a:rPr lang="en-US" dirty="0">
+                <a:hlinkClick r:id="rId2"/>
+              </a:rPr>
+              <a:t>https://mybinder.org</a:t>
+            </a:r>
+            <a:r>
+              <a:rPr lang="en-US" dirty="0"/>
+              <a:t>, type in the URL of your repo, and copy the Markdown or Restructured Text snippet into your README. This snippet will render a badge that people can click. </a:t>
+            </a:r>
+          </a:p>
+          <a:p>
+            <a:pPr marL="0" indent="0">
+              <a:buNone/>
+            </a:pPr>
+            <a:r>
+              <a:rPr lang="en-US" b="1" dirty="0"/>
+              <a:t>TO DO:</a:t>
+            </a:r>
+          </a:p>
+          <a:p>
+            <a:pPr marL="514350" indent="-514350">
+              <a:buFont typeface="+mj-lt"/>
+              <a:buAutoNum type="arabicPeriod"/>
+            </a:pPr>
+            <a:r>
+              <a:rPr lang="en-US" dirty="0"/>
+              <a:t>Add the Markdown snippet from </a:t>
+            </a:r>
+            <a:r>
+              <a:rPr lang="en-US" dirty="0">
+                <a:hlinkClick r:id="rId2"/>
+              </a:rPr>
+              <a:t>https://mybinder.org</a:t>
+            </a:r>
+            <a:r>
+              <a:rPr lang="en-US" dirty="0"/>
+              <a:t> to the </a:t>
+            </a:r>
+            <a:r>
+              <a:rPr lang="en-US" dirty="0" err="1"/>
+              <a:t>README.md</a:t>
+            </a:r>
+            <a:r>
+              <a:rPr lang="en-US" dirty="0"/>
+              <a:t> file in your repo</a:t>
+            </a:r>
+          </a:p>
+          <a:p>
+            <a:pPr lvl="1"/>
+            <a:r>
+              <a:rPr lang="en-US" dirty="0"/>
+              <a:t>The grey bar with a badge in it unfolds the snippets. Click the clipboard next to the box marked with an “m” to automatically copy the Markdown snippet.</a:t>
+            </a:r>
+          </a:p>
+          <a:p>
+            <a:pPr marL="514350" indent="-514350">
+              <a:buFont typeface="+mj-lt"/>
+              <a:buAutoNum type="arabicPeriod"/>
+            </a:pPr>
+            <a:r>
+              <a:rPr lang="en-US" dirty="0"/>
+              <a:t>Click the badge to make sure it works!</a:t>
+            </a:r>
+          </a:p>
+        </p:txBody>
+      </p:sp>
+      <p:pic>
+        <p:nvPicPr>
+          <p:cNvPr id="4" name="Picture 3" descr="Clipart - SMIL animation Verkehrslichtsignalanlage">
+            <a:extLst>
+              <a:ext uri="{FF2B5EF4-FFF2-40B4-BE49-F238E27FC236}">
+                <a16:creationId xmlns:a16="http://schemas.microsoft.com/office/drawing/2014/main" id="{1FC95265-EC88-1B4F-8466-384BAB086AFF}"/>
+              </a:ext>
+            </a:extLst>
+          </p:cNvPr>
+          <p:cNvPicPr>
+            <a:picLocks noChangeAspect="1"/>
+          </p:cNvPicPr>
+          <p:nvPr/>
+        </p:nvPicPr>
+        <p:blipFill rotWithShape="1">
+          <a:blip r:embed="rId3">
+            <a:extLst>
+              <a:ext uri="{837473B0-CC2E-450A-ABE3-18F120FF3D39}">
+                <a1611:picAttrSrcUrl xmlns:a1611="http://schemas.microsoft.com/office/drawing/2016/11/main" r:id="rId4"/>
+              </a:ext>
+            </a:extLst>
+          </a:blip>
+          <a:srcRect l="26721" r="26818"/>
+          <a:stretch/>
+        </p:blipFill>
+        <p:spPr>
+          <a:xfrm>
+            <a:off x="10367963" y="74254"/>
+            <a:ext cx="985837" cy="2832818"/>
+          </a:xfrm>
+          <a:prstGeom prst="rect">
+            <a:avLst/>
+          </a:prstGeom>
+        </p:spPr>
+      </p:pic>
+      <p:pic>
+        <p:nvPicPr>
+          <p:cNvPr id="6" name="Graphic 5">
+            <a:extLst>
+              <a:ext uri="{FF2B5EF4-FFF2-40B4-BE49-F238E27FC236}">
+                <a16:creationId xmlns:a16="http://schemas.microsoft.com/office/drawing/2014/main" id="{EFD2EDA0-678B-DA4C-97C9-599EF6BEFC60}"/>
+              </a:ext>
+            </a:extLst>
+          </p:cNvPr>
+          <p:cNvPicPr>
+            <a:picLocks noChangeAspect="1"/>
+          </p:cNvPicPr>
+          <p:nvPr/>
+        </p:nvPicPr>
+        <p:blipFill>
+          <a:blip r:embed="rId5">
+            <a:extLst>
+              <a:ext uri="{96DAC541-7B7A-43D3-8B79-37D633B846F1}">
+                <asvg:svgBlip xmlns:asvg="http://schemas.microsoft.com/office/drawing/2016/SVG/main" r:embed="rId6"/>
+              </a:ext>
+            </a:extLst>
+          </a:blip>
+          <a:stretch>
+            <a:fillRect/>
+          </a:stretch>
+        </p:blipFill>
+        <p:spPr>
+          <a:xfrm>
+            <a:off x="6267450" y="3671208"/>
+            <a:ext cx="1951264" cy="361345"/>
+          </a:xfrm>
+          <a:prstGeom prst="rect">
+            <a:avLst/>
+          </a:prstGeom>
+        </p:spPr>
+      </p:pic>
+    </p:spTree>
+    <p:extLst>
+      <p:ext uri="{BB962C8B-B14F-4D97-AF65-F5344CB8AC3E}">
+        <p14:creationId xmlns:p14="http://schemas.microsoft.com/office/powerpoint/2010/main" val="2415532205"/>
       </p:ext>
     </p:extLst>
   </p:cSld>

</xml_diff>